<commit_message>
Update Team 3 - Conversation engine for deaf and dumb.pptx
</commit_message>
<xml_diff>
--- a/Team 3 - Conversation engine for deaf and dumb.pptx
+++ b/Team 3 - Conversation engine for deaf and dumb.pptx
@@ -834,7 +834,7 @@
   <p:cSld>
     <p:spTree>
       <p:nvGrpSpPr>
-        <p:cNvPr id="313" name="Shape 313"/>
+        <p:cNvPr id="310" name="Shape 310"/>
         <p:cNvGrpSpPr/>
         <p:nvPr/>
       </p:nvGrpSpPr>
@@ -848,7 +848,7 @@
       </p:grpSpPr>
       <p:sp>
         <p:nvSpPr>
-          <p:cNvPr id="314" name="Google Shape;314;ge42550211f_1_51:notes"/>
+          <p:cNvPr id="311" name="Google Shape;311;ge42550211f_1_51:notes"/>
           <p:cNvSpPr/>
           <p:nvPr>
             <p:ph idx="2" type="sldImg"/>
@@ -883,7 +883,7 @@
       </p:sp>
       <p:sp>
         <p:nvSpPr>
-          <p:cNvPr id="315" name="Google Shape;315;ge42550211f_1_51:notes"/>
+          <p:cNvPr id="312" name="Google Shape;312;ge42550211f_1_51:notes"/>
           <p:cNvSpPr txBox="1"/>
           <p:nvPr>
             <p:ph idx="1" type="body"/>
@@ -933,7 +933,7 @@
   <p:cSld>
     <p:spTree>
       <p:nvGrpSpPr>
-        <p:cNvPr id="319" name="Shape 319"/>
+        <p:cNvPr id="315" name="Shape 315"/>
         <p:cNvGrpSpPr/>
         <p:nvPr/>
       </p:nvGrpSpPr>
@@ -947,7 +947,7 @@
       </p:grpSpPr>
       <p:sp>
         <p:nvSpPr>
-          <p:cNvPr id="320" name="Google Shape;320;ge42550211f_1_56:notes"/>
+          <p:cNvPr id="316" name="Google Shape;316;ge42550211f_1_56:notes"/>
           <p:cNvSpPr/>
           <p:nvPr>
             <p:ph idx="2" type="sldImg"/>
@@ -982,7 +982,7 @@
       </p:sp>
       <p:sp>
         <p:nvSpPr>
-          <p:cNvPr id="321" name="Google Shape;321;ge42550211f_1_56:notes"/>
+          <p:cNvPr id="317" name="Google Shape;317;ge42550211f_1_56:notes"/>
           <p:cNvSpPr txBox="1"/>
           <p:nvPr>
             <p:ph idx="1" type="body"/>
@@ -1032,7 +1032,7 @@
   <p:cSld>
     <p:spTree>
       <p:nvGrpSpPr>
-        <p:cNvPr id="325" name="Shape 325"/>
+        <p:cNvPr id="320" name="Shape 320"/>
         <p:cNvGrpSpPr/>
         <p:nvPr/>
       </p:nvGrpSpPr>
@@ -1046,7 +1046,7 @@
       </p:grpSpPr>
       <p:sp>
         <p:nvSpPr>
-          <p:cNvPr id="326" name="Google Shape;326;ge42550211f_1_28:notes"/>
+          <p:cNvPr id="321" name="Google Shape;321;ge42550211f_1_28:notes"/>
           <p:cNvSpPr/>
           <p:nvPr>
             <p:ph idx="2" type="sldImg"/>
@@ -1081,7 +1081,7 @@
       </p:sp>
       <p:sp>
         <p:nvSpPr>
-          <p:cNvPr id="327" name="Google Shape;327;ge42550211f_1_28:notes"/>
+          <p:cNvPr id="322" name="Google Shape;322;ge42550211f_1_28:notes"/>
           <p:cNvSpPr txBox="1"/>
           <p:nvPr>
             <p:ph idx="1" type="body"/>
@@ -1131,7 +1131,7 @@
   <p:cSld>
     <p:spTree>
       <p:nvGrpSpPr>
-        <p:cNvPr id="332" name="Shape 332"/>
+        <p:cNvPr id="326" name="Shape 326"/>
         <p:cNvGrpSpPr/>
         <p:nvPr/>
       </p:nvGrpSpPr>
@@ -1145,7 +1145,7 @@
       </p:grpSpPr>
       <p:sp>
         <p:nvSpPr>
-          <p:cNvPr id="333" name="Google Shape;333;ge42550211f_1_62:notes"/>
+          <p:cNvPr id="327" name="Google Shape;327;ge42550211f_1_62:notes"/>
           <p:cNvSpPr/>
           <p:nvPr>
             <p:ph idx="2" type="sldImg"/>
@@ -1180,7 +1180,7 @@
       </p:sp>
       <p:sp>
         <p:nvSpPr>
-          <p:cNvPr id="334" name="Google Shape;334;ge42550211f_1_62:notes"/>
+          <p:cNvPr id="328" name="Google Shape;328;ge42550211f_1_62:notes"/>
           <p:cNvSpPr txBox="1"/>
           <p:nvPr>
             <p:ph idx="1" type="body"/>
@@ -1230,7 +1230,7 @@
   <p:cSld>
     <p:spTree>
       <p:nvGrpSpPr>
-        <p:cNvPr id="338" name="Shape 338"/>
+        <p:cNvPr id="331" name="Shape 331"/>
         <p:cNvGrpSpPr/>
         <p:nvPr/>
       </p:nvGrpSpPr>
@@ -1244,7 +1244,7 @@
       </p:grpSpPr>
       <p:sp>
         <p:nvSpPr>
-          <p:cNvPr id="339" name="Google Shape;339;ge42550211f_1_67:notes"/>
+          <p:cNvPr id="332" name="Google Shape;332;ge42550211f_1_67:notes"/>
           <p:cNvSpPr/>
           <p:nvPr>
             <p:ph idx="2" type="sldImg"/>
@@ -1279,7 +1279,7 @@
       </p:sp>
       <p:sp>
         <p:nvSpPr>
-          <p:cNvPr id="340" name="Google Shape;340;ge42550211f_1_67:notes"/>
+          <p:cNvPr id="333" name="Google Shape;333;ge42550211f_1_67:notes"/>
           <p:cNvSpPr txBox="1"/>
           <p:nvPr>
             <p:ph idx="1" type="body"/>
@@ -1329,7 +1329,7 @@
   <p:cSld>
     <p:spTree>
       <p:nvGrpSpPr>
-        <p:cNvPr id="344" name="Shape 344"/>
+        <p:cNvPr id="336" name="Shape 336"/>
         <p:cNvGrpSpPr/>
         <p:nvPr/>
       </p:nvGrpSpPr>
@@ -1343,7 +1343,7 @@
       </p:grpSpPr>
       <p:sp>
         <p:nvSpPr>
-          <p:cNvPr id="345" name="Google Shape;345;ge42550211f_1_71:notes"/>
+          <p:cNvPr id="337" name="Google Shape;337;ge42550211f_1_71:notes"/>
           <p:cNvSpPr/>
           <p:nvPr>
             <p:ph idx="2" type="sldImg"/>
@@ -1378,7 +1378,7 @@
       </p:sp>
       <p:sp>
         <p:nvSpPr>
-          <p:cNvPr id="346" name="Google Shape;346;ge42550211f_1_71:notes"/>
+          <p:cNvPr id="338" name="Google Shape;338;ge42550211f_1_71:notes"/>
           <p:cNvSpPr txBox="1"/>
           <p:nvPr>
             <p:ph idx="1" type="body"/>
@@ -1428,7 +1428,7 @@
   <p:cSld>
     <p:spTree>
       <p:nvGrpSpPr>
-        <p:cNvPr id="350" name="Shape 350"/>
+        <p:cNvPr id="341" name="Shape 341"/>
         <p:cNvGrpSpPr/>
         <p:nvPr/>
       </p:nvGrpSpPr>
@@ -1442,7 +1442,7 @@
       </p:grpSpPr>
       <p:sp>
         <p:nvSpPr>
-          <p:cNvPr id="351" name="Google Shape;351;ge42550211f_1_34:notes"/>
+          <p:cNvPr id="342" name="Google Shape;342;ge42550211f_1_34:notes"/>
           <p:cNvSpPr/>
           <p:nvPr>
             <p:ph idx="2" type="sldImg"/>
@@ -1477,7 +1477,7 @@
       </p:sp>
       <p:sp>
         <p:nvSpPr>
-          <p:cNvPr id="352" name="Google Shape;352;ge42550211f_1_34:notes"/>
+          <p:cNvPr id="343" name="Google Shape;343;ge42550211f_1_34:notes"/>
           <p:cNvSpPr txBox="1"/>
           <p:nvPr>
             <p:ph idx="1" type="body"/>
@@ -1527,7 +1527,7 @@
   <p:cSld>
     <p:spTree>
       <p:nvGrpSpPr>
-        <p:cNvPr id="357" name="Shape 357"/>
+        <p:cNvPr id="347" name="Shape 347"/>
         <p:cNvGrpSpPr/>
         <p:nvPr/>
       </p:nvGrpSpPr>
@@ -1541,7 +1541,7 @@
       </p:grpSpPr>
       <p:sp>
         <p:nvSpPr>
-          <p:cNvPr id="358" name="Google Shape;358;ge42550211f_1_78:notes"/>
+          <p:cNvPr id="348" name="Google Shape;348;ge42550211f_1_78:notes"/>
           <p:cNvSpPr/>
           <p:nvPr>
             <p:ph idx="2" type="sldImg"/>
@@ -1576,7 +1576,7 @@
       </p:sp>
       <p:sp>
         <p:nvSpPr>
-          <p:cNvPr id="359" name="Google Shape;359;ge42550211f_1_78:notes"/>
+          <p:cNvPr id="349" name="Google Shape;349;ge42550211f_1_78:notes"/>
           <p:cNvSpPr txBox="1"/>
           <p:nvPr>
             <p:ph idx="1" type="body"/>
@@ -1626,7 +1626,7 @@
   <p:cSld>
     <p:spTree>
       <p:nvGrpSpPr>
-        <p:cNvPr id="363" name="Shape 363"/>
+        <p:cNvPr id="352" name="Shape 352"/>
         <p:cNvGrpSpPr/>
         <p:nvPr/>
       </p:nvGrpSpPr>
@@ -1640,7 +1640,7 @@
       </p:grpSpPr>
       <p:sp>
         <p:nvSpPr>
-          <p:cNvPr id="364" name="Google Shape;364;ge42550211f_1_83:notes"/>
+          <p:cNvPr id="353" name="Google Shape;353;ge42550211f_1_83:notes"/>
           <p:cNvSpPr/>
           <p:nvPr>
             <p:ph idx="2" type="sldImg"/>
@@ -1675,7 +1675,7 @@
       </p:sp>
       <p:sp>
         <p:nvSpPr>
-          <p:cNvPr id="365" name="Google Shape;365;ge42550211f_1_83:notes"/>
+          <p:cNvPr id="354" name="Google Shape;354;ge42550211f_1_83:notes"/>
           <p:cNvSpPr txBox="1"/>
           <p:nvPr>
             <p:ph idx="1" type="body"/>
@@ -1725,7 +1725,7 @@
   <p:cSld>
     <p:spTree>
       <p:nvGrpSpPr>
-        <p:cNvPr id="370" name="Shape 370"/>
+        <p:cNvPr id="358" name="Shape 358"/>
         <p:cNvGrpSpPr/>
         <p:nvPr/>
       </p:nvGrpSpPr>
@@ -1739,7 +1739,7 @@
       </p:grpSpPr>
       <p:sp>
         <p:nvSpPr>
-          <p:cNvPr id="371" name="Google Shape;371;ge42550211f_1_87:notes"/>
+          <p:cNvPr id="359" name="Google Shape;359;ge42550211f_1_87:notes"/>
           <p:cNvSpPr/>
           <p:nvPr>
             <p:ph idx="2" type="sldImg"/>
@@ -1774,7 +1774,7 @@
       </p:sp>
       <p:sp>
         <p:nvSpPr>
-          <p:cNvPr id="372" name="Google Shape;372;ge42550211f_1_87:notes"/>
+          <p:cNvPr id="360" name="Google Shape;360;ge42550211f_1_87:notes"/>
           <p:cNvSpPr txBox="1"/>
           <p:nvPr>
             <p:ph idx="1" type="body"/>
@@ -1824,7 +1824,7 @@
   <p:cSld>
     <p:spTree>
       <p:nvGrpSpPr>
-        <p:cNvPr id="250" name="Shape 250"/>
+        <p:cNvPr id="255" name="Shape 255"/>
         <p:cNvGrpSpPr/>
         <p:nvPr/>
       </p:nvGrpSpPr>
@@ -1838,7 +1838,7 @@
       </p:grpSpPr>
       <p:sp>
         <p:nvSpPr>
-          <p:cNvPr id="251" name="Google Shape;251;ge42550211f_1_1:notes"/>
+          <p:cNvPr id="256" name="Google Shape;256;ge42550211f_1_1:notes"/>
           <p:cNvSpPr/>
           <p:nvPr>
             <p:ph idx="2" type="sldImg"/>
@@ -1873,7 +1873,7 @@
       </p:sp>
       <p:sp>
         <p:nvSpPr>
-          <p:cNvPr id="252" name="Google Shape;252;ge42550211f_1_1:notes"/>
+          <p:cNvPr id="257" name="Google Shape;257;ge42550211f_1_1:notes"/>
           <p:cNvSpPr txBox="1"/>
           <p:nvPr>
             <p:ph idx="1" type="body"/>
@@ -1923,7 +1923,7 @@
   <p:cSld>
     <p:spTree>
       <p:nvGrpSpPr>
-        <p:cNvPr id="377" name="Shape 377"/>
+        <p:cNvPr id="364" name="Shape 364"/>
         <p:cNvGrpSpPr/>
         <p:nvPr/>
       </p:nvGrpSpPr>
@@ -1937,7 +1937,7 @@
       </p:grpSpPr>
       <p:sp>
         <p:nvSpPr>
-          <p:cNvPr id="378" name="Google Shape;378;ge42550211f_1_91:notes"/>
+          <p:cNvPr id="365" name="Google Shape;365;ge42550211f_1_91:notes"/>
           <p:cNvSpPr/>
           <p:nvPr>
             <p:ph idx="2" type="sldImg"/>
@@ -1972,7 +1972,7 @@
       </p:sp>
       <p:sp>
         <p:nvSpPr>
-          <p:cNvPr id="379" name="Google Shape;379;ge42550211f_1_91:notes"/>
+          <p:cNvPr id="366" name="Google Shape;366;ge42550211f_1_91:notes"/>
           <p:cNvSpPr txBox="1"/>
           <p:nvPr>
             <p:ph idx="1" type="body"/>
@@ -2022,7 +2022,7 @@
   <p:cSld>
     <p:spTree>
       <p:nvGrpSpPr>
-        <p:cNvPr id="257" name="Shape 257"/>
+        <p:cNvPr id="261" name="Shape 261"/>
         <p:cNvGrpSpPr/>
         <p:nvPr/>
       </p:nvGrpSpPr>
@@ -2036,7 +2036,7 @@
       </p:grpSpPr>
       <p:sp>
         <p:nvSpPr>
-          <p:cNvPr id="258" name="Google Shape;258;ga39e485748_0_0:notes"/>
+          <p:cNvPr id="262" name="Google Shape;262;ga39e485748_0_0:notes"/>
           <p:cNvSpPr/>
           <p:nvPr>
             <p:ph idx="2" type="sldImg"/>
@@ -2071,7 +2071,7 @@
       </p:sp>
       <p:sp>
         <p:nvSpPr>
-          <p:cNvPr id="259" name="Google Shape;259;ga39e485748_0_0:notes"/>
+          <p:cNvPr id="263" name="Google Shape;263;ga39e485748_0_0:notes"/>
           <p:cNvSpPr txBox="1"/>
           <p:nvPr>
             <p:ph idx="1" type="body"/>
@@ -2121,7 +2121,7 @@
   <p:cSld>
     <p:spTree>
       <p:nvGrpSpPr>
-        <p:cNvPr id="272" name="Shape 272"/>
+        <p:cNvPr id="275" name="Shape 275"/>
         <p:cNvGrpSpPr/>
         <p:nvPr/>
       </p:nvGrpSpPr>
@@ -2135,7 +2135,7 @@
       </p:grpSpPr>
       <p:sp>
         <p:nvSpPr>
-          <p:cNvPr id="273" name="Google Shape;273;ga39e485748_0_20:notes"/>
+          <p:cNvPr id="276" name="Google Shape;276;ga39e485748_0_20:notes"/>
           <p:cNvSpPr/>
           <p:nvPr>
             <p:ph idx="2" type="sldImg"/>
@@ -2170,7 +2170,7 @@
       </p:sp>
       <p:sp>
         <p:nvSpPr>
-          <p:cNvPr id="274" name="Google Shape;274;ga39e485748_0_20:notes"/>
+          <p:cNvPr id="277" name="Google Shape;277;ga39e485748_0_20:notes"/>
           <p:cNvSpPr txBox="1"/>
           <p:nvPr>
             <p:ph idx="1" type="body"/>
@@ -2220,7 +2220,7 @@
   <p:cSld>
     <p:spTree>
       <p:nvGrpSpPr>
-        <p:cNvPr id="279" name="Shape 279"/>
+        <p:cNvPr id="281" name="Shape 281"/>
         <p:cNvGrpSpPr/>
         <p:nvPr/>
       </p:nvGrpSpPr>
@@ -2234,7 +2234,7 @@
       </p:grpSpPr>
       <p:sp>
         <p:nvSpPr>
-          <p:cNvPr id="280" name="Google Shape;280;ge42550211f_1_95:notes"/>
+          <p:cNvPr id="282" name="Google Shape;282;ge42550211f_1_95:notes"/>
           <p:cNvSpPr/>
           <p:nvPr>
             <p:ph idx="2" type="sldImg"/>
@@ -2269,7 +2269,7 @@
       </p:sp>
       <p:sp>
         <p:nvSpPr>
-          <p:cNvPr id="281" name="Google Shape;281;ge42550211f_1_95:notes"/>
+          <p:cNvPr id="283" name="Google Shape;283;ge42550211f_1_95:notes"/>
           <p:cNvSpPr txBox="1"/>
           <p:nvPr>
             <p:ph idx="1" type="body"/>
@@ -2319,7 +2319,7 @@
   <p:cSld>
     <p:spTree>
       <p:nvGrpSpPr>
-        <p:cNvPr id="286" name="Shape 286"/>
+        <p:cNvPr id="287" name="Shape 287"/>
         <p:cNvGrpSpPr/>
         <p:nvPr/>
       </p:nvGrpSpPr>
@@ -2333,7 +2333,7 @@
       </p:grpSpPr>
       <p:sp>
         <p:nvSpPr>
-          <p:cNvPr id="287" name="Google Shape;287;ge42550211f_1_102:notes"/>
+          <p:cNvPr id="288" name="Google Shape;288;ge42550211f_1_102:notes"/>
           <p:cNvSpPr/>
           <p:nvPr>
             <p:ph idx="2" type="sldImg"/>
@@ -2368,7 +2368,7 @@
       </p:sp>
       <p:sp>
         <p:nvSpPr>
-          <p:cNvPr id="288" name="Google Shape;288;ge42550211f_1_102:notes"/>
+          <p:cNvPr id="289" name="Google Shape;289;ge42550211f_1_102:notes"/>
           <p:cNvSpPr txBox="1"/>
           <p:nvPr>
             <p:ph idx="1" type="body"/>
@@ -2517,7 +2517,7 @@
   <p:cSld>
     <p:spTree>
       <p:nvGrpSpPr>
-        <p:cNvPr id="300" name="Shape 300"/>
+        <p:cNvPr id="299" name="Shape 299"/>
         <p:cNvGrpSpPr/>
         <p:nvPr/>
       </p:nvGrpSpPr>
@@ -2531,7 +2531,7 @@
       </p:grpSpPr>
       <p:sp>
         <p:nvSpPr>
-          <p:cNvPr id="301" name="Google Shape;301;ge42550211f_1_22:notes"/>
+          <p:cNvPr id="300" name="Google Shape;300;ge42550211f_1_22:notes"/>
           <p:cNvSpPr/>
           <p:nvPr>
             <p:ph idx="2" type="sldImg"/>
@@ -2566,7 +2566,7 @@
       </p:sp>
       <p:sp>
         <p:nvSpPr>
-          <p:cNvPr id="302" name="Google Shape;302;ge42550211f_1_22:notes"/>
+          <p:cNvPr id="301" name="Google Shape;301;ge42550211f_1_22:notes"/>
           <p:cNvSpPr txBox="1"/>
           <p:nvPr>
             <p:ph idx="1" type="body"/>
@@ -2616,7 +2616,7 @@
   <p:cSld>
     <p:spTree>
       <p:nvGrpSpPr>
-        <p:cNvPr id="307" name="Shape 307"/>
+        <p:cNvPr id="305" name="Shape 305"/>
         <p:cNvGrpSpPr/>
         <p:nvPr/>
       </p:nvGrpSpPr>
@@ -2630,7 +2630,7 @@
       </p:grpSpPr>
       <p:sp>
         <p:nvSpPr>
-          <p:cNvPr id="308" name="Google Shape;308;ge42550211f_1_45:notes"/>
+          <p:cNvPr id="306" name="Google Shape;306;ge42550211f_1_45:notes"/>
           <p:cNvSpPr/>
           <p:nvPr>
             <p:ph idx="2" type="sldImg"/>
@@ -2665,7 +2665,7 @@
       </p:sp>
       <p:sp>
         <p:nvSpPr>
-          <p:cNvPr id="309" name="Google Shape;309;ge42550211f_1_45:notes"/>
+          <p:cNvPr id="307" name="Google Shape;307;ge42550211f_1_45:notes"/>
           <p:cNvSpPr txBox="1"/>
           <p:nvPr>
             <p:ph idx="1" type="body"/>
@@ -28025,6 +28025,51 @@
       <p:sp>
         <p:nvSpPr>
           <p:cNvPr id="248" name="Google Shape;248;p31"/>
+          <p:cNvSpPr/>
+          <p:nvPr/>
+        </p:nvSpPr>
+        <p:spPr>
+          <a:xfrm>
+            <a:off x="0" y="580100"/>
+            <a:ext cx="9144000" cy="1245600"/>
+          </a:xfrm>
+          <a:prstGeom prst="rect">
+            <a:avLst/>
+          </a:prstGeom>
+          <a:solidFill>
+            <a:srgbClr val="CCCCCC">
+              <a:alpha val="56420"/>
+            </a:srgbClr>
+          </a:solidFill>
+          <a:ln>
+            <a:noFill/>
+          </a:ln>
+        </p:spPr>
+        <p:txBody>
+          <a:bodyPr anchorCtr="0" anchor="ctr" bIns="91425" lIns="91425" spcFirstLastPara="1" rIns="91425" wrap="square" tIns="91425">
+            <a:noAutofit/>
+          </a:bodyPr>
+          <a:lstStyle/>
+          <a:p>
+            <a:pPr indent="0" lvl="0" marL="0" rtl="0" algn="l">
+              <a:spcBef>
+                <a:spcPts val="0"/>
+              </a:spcBef>
+              <a:spcAft>
+                <a:spcPts val="0"/>
+              </a:spcAft>
+              <a:buNone/>
+            </a:pPr>
+            <a:r>
+              <a:t/>
+            </a:r>
+            <a:endParaRPr/>
+          </a:p>
+        </p:txBody>
+      </p:sp>
+      <p:sp>
+        <p:nvSpPr>
+          <p:cNvPr id="249" name="Google Shape;249;p31"/>
           <p:cNvSpPr txBox="1"/>
           <p:nvPr>
             <p:ph type="title"/>
@@ -28069,7 +28114,7 @@
       </p:sp>
       <p:sp>
         <p:nvSpPr>
-          <p:cNvPr id="249" name="Google Shape;249;p31"/>
+          <p:cNvPr id="250" name="Google Shape;250;p31"/>
           <p:cNvSpPr txBox="1"/>
           <p:nvPr>
             <p:ph idx="1" type="subTitle"/>
@@ -28112,6 +28157,118 @@
           </a:p>
         </p:txBody>
       </p:sp>
+      <p:pic>
+        <p:nvPicPr>
+          <p:cNvPr id="251" name="Google Shape;251;p31"/>
+          <p:cNvPicPr preferRelativeResize="0"/>
+          <p:nvPr/>
+        </p:nvPicPr>
+        <p:blipFill>
+          <a:blip r:embed="rId3">
+            <a:alphaModFix/>
+          </a:blip>
+          <a:stretch>
+            <a:fillRect/>
+          </a:stretch>
+        </p:blipFill>
+        <p:spPr>
+          <a:xfrm>
+            <a:off x="2086050" y="802700"/>
+            <a:ext cx="2741625" cy="728050"/>
+          </a:xfrm>
+          <a:prstGeom prst="rect">
+            <a:avLst/>
+          </a:prstGeom>
+          <a:noFill/>
+          <a:ln>
+            <a:noFill/>
+          </a:ln>
+        </p:spPr>
+      </p:pic>
+      <p:pic>
+        <p:nvPicPr>
+          <p:cNvPr id="252" name="Google Shape;252;p31"/>
+          <p:cNvPicPr preferRelativeResize="0"/>
+          <p:nvPr/>
+        </p:nvPicPr>
+        <p:blipFill>
+          <a:blip r:embed="rId4">
+            <a:alphaModFix/>
+          </a:blip>
+          <a:stretch>
+            <a:fillRect/>
+          </a:stretch>
+        </p:blipFill>
+        <p:spPr>
+          <a:xfrm>
+            <a:off x="351475" y="591450"/>
+            <a:ext cx="1457401" cy="1150550"/>
+          </a:xfrm>
+          <a:prstGeom prst="rect">
+            <a:avLst/>
+          </a:prstGeom>
+          <a:noFill/>
+          <a:ln>
+            <a:noFill/>
+          </a:ln>
+        </p:spPr>
+      </p:pic>
+      <p:pic>
+        <p:nvPicPr>
+          <p:cNvPr id="253" name="Google Shape;253;p31"/>
+          <p:cNvPicPr preferRelativeResize="0"/>
+          <p:nvPr/>
+        </p:nvPicPr>
+        <p:blipFill>
+          <a:blip r:embed="rId5">
+            <a:alphaModFix/>
+          </a:blip>
+          <a:stretch>
+            <a:fillRect/>
+          </a:stretch>
+        </p:blipFill>
+        <p:spPr>
+          <a:xfrm>
+            <a:off x="4892125" y="335275"/>
+            <a:ext cx="1662902" cy="1662902"/>
+          </a:xfrm>
+          <a:prstGeom prst="rect">
+            <a:avLst/>
+          </a:prstGeom>
+          <a:noFill/>
+          <a:ln>
+            <a:noFill/>
+          </a:ln>
+        </p:spPr>
+      </p:pic>
+      <p:pic>
+        <p:nvPicPr>
+          <p:cNvPr id="254" name="Google Shape;254;p31"/>
+          <p:cNvPicPr preferRelativeResize="0"/>
+          <p:nvPr/>
+        </p:nvPicPr>
+        <p:blipFill>
+          <a:blip r:embed="rId6">
+            <a:alphaModFix/>
+          </a:blip>
+          <a:stretch>
+            <a:fillRect/>
+          </a:stretch>
+        </p:blipFill>
+        <p:spPr>
+          <a:xfrm>
+            <a:off x="6935326" y="675213"/>
+            <a:ext cx="1390351" cy="983022"/>
+          </a:xfrm>
+          <a:prstGeom prst="rect">
+            <a:avLst/>
+          </a:prstGeom>
+          <a:noFill/>
+          <a:ln>
+            <a:noFill/>
+          </a:ln>
+        </p:spPr>
+      </p:pic>
     </p:spTree>
   </p:cSld>
   <p:clrMapOvr>
@@ -28151,7 +28308,7 @@
                                           </p:stCondLst>
                                         </p:cTn>
                                         <p:tgtEl>
-                                          <p:spTgt spid="248"/>
+                                          <p:spTgt spid="249"/>
                                         </p:tgtEl>
                                         <p:attrNameLst>
                                           <p:attrName>style.visibility</p:attrName>
@@ -28165,7 +28322,7 @@
                                       <p:cBhvr>
                                         <p:cTn dur="1000"/>
                                         <p:tgtEl>
-                                          <p:spTgt spid="248"/>
+                                          <p:spTgt spid="249"/>
                                         </p:tgtEl>
                                       </p:cBhvr>
                                     </p:animEffect>
@@ -28186,7 +28343,7 @@
                                           </p:stCondLst>
                                         </p:cTn>
                                         <p:tgtEl>
-                                          <p:spTgt spid="249"/>
+                                          <p:spTgt spid="250"/>
                                         </p:tgtEl>
                                         <p:attrNameLst>
                                           <p:attrName>style.visibility</p:attrName>
@@ -28200,7 +28357,7 @@
                                       <p:cBhvr additive="base">
                                         <p:cTn dur="1000"/>
                                         <p:tgtEl>
-                                          <p:spTgt spid="249"/>
+                                          <p:spTgt spid="250"/>
                                         </p:tgtEl>
                                         <p:attrNameLst>
                                           <p:attrName>ppt_y</p:attrName>
@@ -28258,7 +28415,7 @@
   <p:cSld>
     <p:spTree>
       <p:nvGrpSpPr>
-        <p:cNvPr id="316" name="Shape 316"/>
+        <p:cNvPr id="313" name="Shape 313"/>
         <p:cNvGrpSpPr/>
         <p:nvPr/>
       </p:nvGrpSpPr>
@@ -28272,40 +28429,12 @@
       </p:grpSpPr>
       <p:pic>
         <p:nvPicPr>
-          <p:cNvPr id="317" name="Google Shape;317;p40"/>
+          <p:cNvPr id="314" name="Google Shape;314;p40"/>
           <p:cNvPicPr preferRelativeResize="0"/>
           <p:nvPr/>
         </p:nvPicPr>
         <p:blipFill>
           <a:blip r:embed="rId3">
-            <a:alphaModFix/>
-          </a:blip>
-          <a:stretch>
-            <a:fillRect/>
-          </a:stretch>
-        </p:blipFill>
-        <p:spPr>
-          <a:xfrm>
-            <a:off x="7964475" y="154750"/>
-            <a:ext cx="1007550" cy="676470"/>
-          </a:xfrm>
-          <a:prstGeom prst="rect">
-            <a:avLst/>
-          </a:prstGeom>
-          <a:noFill/>
-          <a:ln>
-            <a:noFill/>
-          </a:ln>
-        </p:spPr>
-      </p:pic>
-      <p:pic>
-        <p:nvPicPr>
-          <p:cNvPr id="318" name="Google Shape;318;p40"/>
-          <p:cNvPicPr preferRelativeResize="0"/>
-          <p:nvPr/>
-        </p:nvPicPr>
-        <p:blipFill>
-          <a:blip r:embed="rId4">
             <a:alphaModFix/>
           </a:blip>
           <a:stretch>
@@ -28339,7 +28468,7 @@
   <p:cSld>
     <p:spTree>
       <p:nvGrpSpPr>
-        <p:cNvPr id="322" name="Shape 322"/>
+        <p:cNvPr id="318" name="Shape 318"/>
         <p:cNvGrpSpPr/>
         <p:nvPr/>
       </p:nvGrpSpPr>
@@ -28353,40 +28482,12 @@
       </p:grpSpPr>
       <p:pic>
         <p:nvPicPr>
-          <p:cNvPr id="323" name="Google Shape;323;p41"/>
+          <p:cNvPr id="319" name="Google Shape;319;p41"/>
           <p:cNvPicPr preferRelativeResize="0"/>
           <p:nvPr/>
         </p:nvPicPr>
         <p:blipFill>
           <a:blip r:embed="rId3">
-            <a:alphaModFix/>
-          </a:blip>
-          <a:stretch>
-            <a:fillRect/>
-          </a:stretch>
-        </p:blipFill>
-        <p:spPr>
-          <a:xfrm>
-            <a:off x="7964475" y="154750"/>
-            <a:ext cx="1007550" cy="676470"/>
-          </a:xfrm>
-          <a:prstGeom prst="rect">
-            <a:avLst/>
-          </a:prstGeom>
-          <a:noFill/>
-          <a:ln>
-            <a:noFill/>
-          </a:ln>
-        </p:spPr>
-      </p:pic>
-      <p:pic>
-        <p:nvPicPr>
-          <p:cNvPr id="324" name="Google Shape;324;p41"/>
-          <p:cNvPicPr preferRelativeResize="0"/>
-          <p:nvPr/>
-        </p:nvPicPr>
-        <p:blipFill>
-          <a:blip r:embed="rId4">
             <a:alphaModFix/>
           </a:blip>
           <a:stretch>
@@ -28420,7 +28521,7 @@
   <p:cSld>
     <p:spTree>
       <p:nvGrpSpPr>
-        <p:cNvPr id="328" name="Shape 328"/>
+        <p:cNvPr id="323" name="Shape 323"/>
         <p:cNvGrpSpPr/>
         <p:nvPr/>
       </p:nvGrpSpPr>
@@ -28434,7 +28535,7 @@
       </p:grpSpPr>
       <p:sp>
         <p:nvSpPr>
-          <p:cNvPr id="329" name="Google Shape;329;p42"/>
+          <p:cNvPr id="324" name="Google Shape;324;p42"/>
           <p:cNvSpPr txBox="1"/>
           <p:nvPr>
             <p:ph type="ctrTitle"/>
@@ -28479,7 +28580,7 @@
       </p:sp>
       <p:sp>
         <p:nvSpPr>
-          <p:cNvPr id="330" name="Google Shape;330;p42"/>
+          <p:cNvPr id="325" name="Google Shape;325;p42"/>
           <p:cNvSpPr txBox="1"/>
           <p:nvPr>
             <p:ph idx="1" type="subTitle"/>
@@ -28522,34 +28623,6 @@
           </a:p>
         </p:txBody>
       </p:sp>
-      <p:pic>
-        <p:nvPicPr>
-          <p:cNvPr id="331" name="Google Shape;331;p42"/>
-          <p:cNvPicPr preferRelativeResize="0"/>
-          <p:nvPr/>
-        </p:nvPicPr>
-        <p:blipFill>
-          <a:blip r:embed="rId3">
-            <a:alphaModFix/>
-          </a:blip>
-          <a:stretch>
-            <a:fillRect/>
-          </a:stretch>
-        </p:blipFill>
-        <p:spPr>
-          <a:xfrm>
-            <a:off x="7964475" y="154750"/>
-            <a:ext cx="1007550" cy="676470"/>
-          </a:xfrm>
-          <a:prstGeom prst="rect">
-            <a:avLst/>
-          </a:prstGeom>
-          <a:noFill/>
-          <a:ln>
-            <a:noFill/>
-          </a:ln>
-        </p:spPr>
-      </p:pic>
     </p:spTree>
   </p:cSld>
   <p:clrMapOvr>
@@ -28585,7 +28658,7 @@
                                       <p:cBhvr additive="base">
                                         <p:cTn dur="1000"/>
                                         <p:tgtEl>
-                                          <p:spTgt spid="329"/>
+                                          <p:spTgt spid="324"/>
                                         </p:tgtEl>
                                         <p:attrNameLst>
                                           <p:attrName>ppt_x</p:attrName>
@@ -28612,7 +28685,7 @@
                                           </p:stCondLst>
                                         </p:cTn>
                                         <p:tgtEl>
-                                          <p:spTgt spid="329"/>
+                                          <p:spTgt spid="324"/>
                                         </p:tgtEl>
                                         <p:attrNameLst>
                                           <p:attrName>style.visibility</p:attrName>
@@ -28657,7 +28730,7 @@
                                           </p:stCondLst>
                                         </p:cTn>
                                         <p:tgtEl>
-                                          <p:spTgt spid="330"/>
+                                          <p:spTgt spid="325"/>
                                         </p:tgtEl>
                                         <p:attrNameLst>
                                           <p:attrName>style.visibility</p:attrName>
@@ -28671,7 +28744,7 @@
                                       <p:cBhvr>
                                         <p:cTn dur="1000"/>
                                         <p:tgtEl>
-                                          <p:spTgt spid="330"/>
+                                          <p:spTgt spid="325"/>
                                         </p:tgtEl>
                                       </p:cBhvr>
                                     </p:animEffect>
@@ -28714,7 +28787,7 @@
   <p:cSld>
     <p:spTree>
       <p:nvGrpSpPr>
-        <p:cNvPr id="335" name="Shape 335"/>
+        <p:cNvPr id="329" name="Shape 329"/>
         <p:cNvGrpSpPr/>
         <p:nvPr/>
       </p:nvGrpSpPr>
@@ -28728,40 +28801,12 @@
       </p:grpSpPr>
       <p:pic>
         <p:nvPicPr>
-          <p:cNvPr id="336" name="Google Shape;336;p43"/>
+          <p:cNvPr id="330" name="Google Shape;330;p43"/>
           <p:cNvPicPr preferRelativeResize="0"/>
           <p:nvPr/>
         </p:nvPicPr>
         <p:blipFill>
           <a:blip r:embed="rId3">
-            <a:alphaModFix/>
-          </a:blip>
-          <a:stretch>
-            <a:fillRect/>
-          </a:stretch>
-        </p:blipFill>
-        <p:spPr>
-          <a:xfrm>
-            <a:off x="7964475" y="154750"/>
-            <a:ext cx="1007550" cy="676470"/>
-          </a:xfrm>
-          <a:prstGeom prst="rect">
-            <a:avLst/>
-          </a:prstGeom>
-          <a:noFill/>
-          <a:ln>
-            <a:noFill/>
-          </a:ln>
-        </p:spPr>
-      </p:pic>
-      <p:pic>
-        <p:nvPicPr>
-          <p:cNvPr id="337" name="Google Shape;337;p43"/>
-          <p:cNvPicPr preferRelativeResize="0"/>
-          <p:nvPr/>
-        </p:nvPicPr>
-        <p:blipFill>
-          <a:blip r:embed="rId4">
             <a:alphaModFix/>
           </a:blip>
           <a:stretch>
@@ -28795,7 +28840,7 @@
   <p:cSld>
     <p:spTree>
       <p:nvGrpSpPr>
-        <p:cNvPr id="341" name="Shape 341"/>
+        <p:cNvPr id="334" name="Shape 334"/>
         <p:cNvGrpSpPr/>
         <p:nvPr/>
       </p:nvGrpSpPr>
@@ -28809,40 +28854,12 @@
       </p:grpSpPr>
       <p:pic>
         <p:nvPicPr>
-          <p:cNvPr id="342" name="Google Shape;342;p44"/>
+          <p:cNvPr id="335" name="Google Shape;335;p44"/>
           <p:cNvPicPr preferRelativeResize="0"/>
           <p:nvPr/>
         </p:nvPicPr>
         <p:blipFill>
           <a:blip r:embed="rId3">
-            <a:alphaModFix/>
-          </a:blip>
-          <a:stretch>
-            <a:fillRect/>
-          </a:stretch>
-        </p:blipFill>
-        <p:spPr>
-          <a:xfrm>
-            <a:off x="7964475" y="154750"/>
-            <a:ext cx="1007550" cy="676470"/>
-          </a:xfrm>
-          <a:prstGeom prst="rect">
-            <a:avLst/>
-          </a:prstGeom>
-          <a:noFill/>
-          <a:ln>
-            <a:noFill/>
-          </a:ln>
-        </p:spPr>
-      </p:pic>
-      <p:pic>
-        <p:nvPicPr>
-          <p:cNvPr id="343" name="Google Shape;343;p44"/>
-          <p:cNvPicPr preferRelativeResize="0"/>
-          <p:nvPr/>
-        </p:nvPicPr>
-        <p:blipFill>
-          <a:blip r:embed="rId4">
             <a:alphaModFix/>
           </a:blip>
           <a:stretch>
@@ -28876,7 +28893,7 @@
   <p:cSld>
     <p:spTree>
       <p:nvGrpSpPr>
-        <p:cNvPr id="347" name="Shape 347"/>
+        <p:cNvPr id="339" name="Shape 339"/>
         <p:cNvGrpSpPr/>
         <p:nvPr/>
       </p:nvGrpSpPr>
@@ -28890,40 +28907,12 @@
       </p:grpSpPr>
       <p:pic>
         <p:nvPicPr>
-          <p:cNvPr id="348" name="Google Shape;348;p45"/>
+          <p:cNvPr id="340" name="Google Shape;340;p45"/>
           <p:cNvPicPr preferRelativeResize="0"/>
           <p:nvPr/>
         </p:nvPicPr>
         <p:blipFill>
           <a:blip r:embed="rId3">
-            <a:alphaModFix/>
-          </a:blip>
-          <a:stretch>
-            <a:fillRect/>
-          </a:stretch>
-        </p:blipFill>
-        <p:spPr>
-          <a:xfrm>
-            <a:off x="7964475" y="154750"/>
-            <a:ext cx="1007550" cy="676470"/>
-          </a:xfrm>
-          <a:prstGeom prst="rect">
-            <a:avLst/>
-          </a:prstGeom>
-          <a:noFill/>
-          <a:ln>
-            <a:noFill/>
-          </a:ln>
-        </p:spPr>
-      </p:pic>
-      <p:pic>
-        <p:nvPicPr>
-          <p:cNvPr id="349" name="Google Shape;349;p45"/>
-          <p:cNvPicPr preferRelativeResize="0"/>
-          <p:nvPr/>
-        </p:nvPicPr>
-        <p:blipFill>
-          <a:blip r:embed="rId4">
             <a:alphaModFix/>
           </a:blip>
           <a:stretch>
@@ -28957,7 +28946,7 @@
   <p:cSld>
     <p:spTree>
       <p:nvGrpSpPr>
-        <p:cNvPr id="353" name="Shape 353"/>
+        <p:cNvPr id="344" name="Shape 344"/>
         <p:cNvGrpSpPr/>
         <p:nvPr/>
       </p:nvGrpSpPr>
@@ -28971,7 +28960,7 @@
       </p:grpSpPr>
       <p:sp>
         <p:nvSpPr>
-          <p:cNvPr id="354" name="Google Shape;354;p46"/>
+          <p:cNvPr id="345" name="Google Shape;345;p46"/>
           <p:cNvSpPr txBox="1"/>
           <p:nvPr>
             <p:ph type="ctrTitle"/>
@@ -29016,7 +29005,7 @@
       </p:sp>
       <p:sp>
         <p:nvSpPr>
-          <p:cNvPr id="355" name="Google Shape;355;p46"/>
+          <p:cNvPr id="346" name="Google Shape;346;p46"/>
           <p:cNvSpPr txBox="1"/>
           <p:nvPr>
             <p:ph idx="1" type="subTitle"/>
@@ -29100,34 +29089,6 @@
           </a:p>
         </p:txBody>
       </p:sp>
-      <p:pic>
-        <p:nvPicPr>
-          <p:cNvPr id="356" name="Google Shape;356;p46"/>
-          <p:cNvPicPr preferRelativeResize="0"/>
-          <p:nvPr/>
-        </p:nvPicPr>
-        <p:blipFill>
-          <a:blip r:embed="rId3">
-            <a:alphaModFix/>
-          </a:blip>
-          <a:stretch>
-            <a:fillRect/>
-          </a:stretch>
-        </p:blipFill>
-        <p:spPr>
-          <a:xfrm>
-            <a:off x="7964475" y="154750"/>
-            <a:ext cx="1007550" cy="676470"/>
-          </a:xfrm>
-          <a:prstGeom prst="rect">
-            <a:avLst/>
-          </a:prstGeom>
-          <a:noFill/>
-          <a:ln>
-            <a:noFill/>
-          </a:ln>
-        </p:spPr>
-      </p:pic>
     </p:spTree>
   </p:cSld>
   <p:clrMapOvr>
@@ -29163,7 +29124,7 @@
                                       <p:cBhvr additive="base">
                                         <p:cTn dur="1000"/>
                                         <p:tgtEl>
-                                          <p:spTgt spid="354"/>
+                                          <p:spTgt spid="345"/>
                                         </p:tgtEl>
                                         <p:attrNameLst>
                                           <p:attrName>ppt_x</p:attrName>
@@ -29190,7 +29151,7 @@
                                           </p:stCondLst>
                                         </p:cTn>
                                         <p:tgtEl>
-                                          <p:spTgt spid="354"/>
+                                          <p:spTgt spid="345"/>
                                         </p:tgtEl>
                                         <p:attrNameLst>
                                           <p:attrName>style.visibility</p:attrName>
@@ -29235,7 +29196,7 @@
                                           </p:stCondLst>
                                         </p:cTn>
                                         <p:tgtEl>
-                                          <p:spTgt spid="355"/>
+                                          <p:spTgt spid="346"/>
                                         </p:tgtEl>
                                         <p:attrNameLst>
                                           <p:attrName>style.visibility</p:attrName>
@@ -29249,7 +29210,7 @@
                                       <p:cBhvr>
                                         <p:cTn dur="1000"/>
                                         <p:tgtEl>
-                                          <p:spTgt spid="355"/>
+                                          <p:spTgt spid="346"/>
                                         </p:tgtEl>
                                       </p:cBhvr>
                                     </p:animEffect>
@@ -29292,7 +29253,7 @@
   <p:cSld>
     <p:spTree>
       <p:nvGrpSpPr>
-        <p:cNvPr id="360" name="Shape 360"/>
+        <p:cNvPr id="350" name="Shape 350"/>
         <p:cNvGrpSpPr/>
         <p:nvPr/>
       </p:nvGrpSpPr>
@@ -29304,37 +29265,9 @@
           <a:chExt cx="0" cy="0"/>
         </a:xfrm>
       </p:grpSpPr>
-      <p:pic>
-        <p:nvPicPr>
-          <p:cNvPr id="361" name="Google Shape;361;p47"/>
-          <p:cNvPicPr preferRelativeResize="0"/>
-          <p:nvPr/>
-        </p:nvPicPr>
-        <p:blipFill>
-          <a:blip r:embed="rId3">
-            <a:alphaModFix/>
-          </a:blip>
-          <a:stretch>
-            <a:fillRect/>
-          </a:stretch>
-        </p:blipFill>
-        <p:spPr>
-          <a:xfrm>
-            <a:off x="7964475" y="154750"/>
-            <a:ext cx="1007550" cy="676470"/>
-          </a:xfrm>
-          <a:prstGeom prst="rect">
-            <a:avLst/>
-          </a:prstGeom>
-          <a:noFill/>
-          <a:ln>
-            <a:noFill/>
-          </a:ln>
-        </p:spPr>
-      </p:pic>
       <p:sp>
         <p:nvSpPr>
-          <p:cNvPr id="362" name="Google Shape;362;p47"/>
+          <p:cNvPr id="351" name="Google Shape;351;p47"/>
           <p:cNvSpPr txBox="1"/>
           <p:nvPr>
             <p:ph type="ctrTitle"/>
@@ -29390,7 +29323,7 @@
   <p:cSld>
     <p:spTree>
       <p:nvGrpSpPr>
-        <p:cNvPr id="366" name="Shape 366"/>
+        <p:cNvPr id="355" name="Shape 355"/>
         <p:cNvGrpSpPr/>
         <p:nvPr/>
       </p:nvGrpSpPr>
@@ -29402,37 +29335,9 @@
           <a:chExt cx="0" cy="0"/>
         </a:xfrm>
       </p:grpSpPr>
-      <p:pic>
-        <p:nvPicPr>
-          <p:cNvPr id="367" name="Google Shape;367;p48"/>
-          <p:cNvPicPr preferRelativeResize="0"/>
-          <p:nvPr/>
-        </p:nvPicPr>
-        <p:blipFill>
-          <a:blip r:embed="rId3">
-            <a:alphaModFix/>
-          </a:blip>
-          <a:stretch>
-            <a:fillRect/>
-          </a:stretch>
-        </p:blipFill>
-        <p:spPr>
-          <a:xfrm>
-            <a:off x="7964475" y="154750"/>
-            <a:ext cx="1007550" cy="676470"/>
-          </a:xfrm>
-          <a:prstGeom prst="rect">
-            <a:avLst/>
-          </a:prstGeom>
-          <a:noFill/>
-          <a:ln>
-            <a:noFill/>
-          </a:ln>
-        </p:spPr>
-      </p:pic>
       <p:sp>
         <p:nvSpPr>
-          <p:cNvPr id="368" name="Google Shape;368;p48"/>
+          <p:cNvPr id="356" name="Google Shape;356;p48"/>
           <p:cNvSpPr txBox="1"/>
           <p:nvPr>
             <p:ph type="ctrTitle"/>
@@ -29477,7 +29382,7 @@
       </p:sp>
       <p:sp>
         <p:nvSpPr>
-          <p:cNvPr id="369" name="Google Shape;369;p48"/>
+          <p:cNvPr id="357" name="Google Shape;357;p48"/>
           <p:cNvSpPr txBox="1"/>
           <p:nvPr>
             <p:ph idx="1" type="subTitle"/>
@@ -29628,7 +29533,7 @@
   <p:cSld>
     <p:spTree>
       <p:nvGrpSpPr>
-        <p:cNvPr id="373" name="Shape 373"/>
+        <p:cNvPr id="361" name="Shape 361"/>
         <p:cNvGrpSpPr/>
         <p:nvPr/>
       </p:nvGrpSpPr>
@@ -29640,37 +29545,9 @@
           <a:chExt cx="0" cy="0"/>
         </a:xfrm>
       </p:grpSpPr>
-      <p:pic>
-        <p:nvPicPr>
-          <p:cNvPr id="374" name="Google Shape;374;p49"/>
-          <p:cNvPicPr preferRelativeResize="0"/>
-          <p:nvPr/>
-        </p:nvPicPr>
-        <p:blipFill>
-          <a:blip r:embed="rId3">
-            <a:alphaModFix/>
-          </a:blip>
-          <a:stretch>
-            <a:fillRect/>
-          </a:stretch>
-        </p:blipFill>
-        <p:spPr>
-          <a:xfrm>
-            <a:off x="7964475" y="154750"/>
-            <a:ext cx="1007550" cy="676470"/>
-          </a:xfrm>
-          <a:prstGeom prst="rect">
-            <a:avLst/>
-          </a:prstGeom>
-          <a:noFill/>
-          <a:ln>
-            <a:noFill/>
-          </a:ln>
-        </p:spPr>
-      </p:pic>
       <p:sp>
         <p:nvSpPr>
-          <p:cNvPr id="375" name="Google Shape;375;p49"/>
+          <p:cNvPr id="362" name="Google Shape;362;p49"/>
           <p:cNvSpPr txBox="1"/>
           <p:nvPr>
             <p:ph type="ctrTitle"/>
@@ -29715,7 +29592,7 @@
       </p:sp>
       <p:sp>
         <p:nvSpPr>
-          <p:cNvPr id="376" name="Google Shape;376;p49"/>
+          <p:cNvPr id="363" name="Google Shape;363;p49"/>
           <p:cNvSpPr txBox="1"/>
           <p:nvPr>
             <p:ph idx="1" type="subTitle"/>
@@ -29874,7 +29751,7 @@
   <p:cSld>
     <p:spTree>
       <p:nvGrpSpPr>
-        <p:cNvPr id="253" name="Shape 253"/>
+        <p:cNvPr id="258" name="Shape 258"/>
         <p:cNvGrpSpPr/>
         <p:nvPr/>
       </p:nvGrpSpPr>
@@ -29888,7 +29765,7 @@
       </p:grpSpPr>
       <p:sp>
         <p:nvSpPr>
-          <p:cNvPr id="254" name="Google Shape;254;p32"/>
+          <p:cNvPr id="259" name="Google Shape;259;p32"/>
           <p:cNvSpPr txBox="1"/>
           <p:nvPr/>
         </p:nvSpPr>
@@ -30120,7 +29997,7 @@
       </p:sp>
       <p:sp>
         <p:nvSpPr>
-          <p:cNvPr id="255" name="Google Shape;255;p32"/>
+          <p:cNvPr id="260" name="Google Shape;260;p32"/>
           <p:cNvSpPr txBox="1"/>
           <p:nvPr/>
         </p:nvSpPr>
@@ -30176,34 +30053,6 @@
           </a:p>
         </p:txBody>
       </p:sp>
-      <p:pic>
-        <p:nvPicPr>
-          <p:cNvPr id="256" name="Google Shape;256;p32"/>
-          <p:cNvPicPr preferRelativeResize="0"/>
-          <p:nvPr/>
-        </p:nvPicPr>
-        <p:blipFill>
-          <a:blip r:embed="rId3">
-            <a:alphaModFix/>
-          </a:blip>
-          <a:stretch>
-            <a:fillRect/>
-          </a:stretch>
-        </p:blipFill>
-        <p:spPr>
-          <a:xfrm>
-            <a:off x="7964475" y="154750"/>
-            <a:ext cx="1007550" cy="676470"/>
-          </a:xfrm>
-          <a:prstGeom prst="rect">
-            <a:avLst/>
-          </a:prstGeom>
-          <a:noFill/>
-          <a:ln>
-            <a:noFill/>
-          </a:ln>
-        </p:spPr>
-      </p:pic>
     </p:spTree>
   </p:cSld>
   <p:clrMapOvr>
@@ -30217,7 +30066,7 @@
   <p:cSld>
     <p:spTree>
       <p:nvGrpSpPr>
-        <p:cNvPr id="380" name="Shape 380"/>
+        <p:cNvPr id="367" name="Shape 367"/>
         <p:cNvGrpSpPr/>
         <p:nvPr/>
       </p:nvGrpSpPr>
@@ -30229,37 +30078,9 @@
           <a:chExt cx="0" cy="0"/>
         </a:xfrm>
       </p:grpSpPr>
-      <p:pic>
-        <p:nvPicPr>
-          <p:cNvPr id="381" name="Google Shape;381;p50"/>
-          <p:cNvPicPr preferRelativeResize="0"/>
-          <p:nvPr/>
-        </p:nvPicPr>
-        <p:blipFill>
-          <a:blip r:embed="rId3">
-            <a:alphaModFix/>
-          </a:blip>
-          <a:stretch>
-            <a:fillRect/>
-          </a:stretch>
-        </p:blipFill>
-        <p:spPr>
-          <a:xfrm>
-            <a:off x="7964475" y="154750"/>
-            <a:ext cx="1007550" cy="676470"/>
-          </a:xfrm>
-          <a:prstGeom prst="rect">
-            <a:avLst/>
-          </a:prstGeom>
-          <a:noFill/>
-          <a:ln>
-            <a:noFill/>
-          </a:ln>
-        </p:spPr>
-      </p:pic>
       <p:sp>
         <p:nvSpPr>
-          <p:cNvPr id="382" name="Google Shape;382;p50"/>
+          <p:cNvPr id="368" name="Google Shape;368;p50"/>
           <p:cNvSpPr txBox="1"/>
           <p:nvPr>
             <p:ph type="ctrTitle"/>
@@ -30319,7 +30140,7 @@
   <p:cSld>
     <p:spTree>
       <p:nvGrpSpPr>
-        <p:cNvPr id="260" name="Shape 260"/>
+        <p:cNvPr id="264" name="Shape 264"/>
         <p:cNvGrpSpPr/>
         <p:nvPr/>
       </p:nvGrpSpPr>
@@ -30333,7 +30154,7 @@
       </p:grpSpPr>
       <p:sp>
         <p:nvSpPr>
-          <p:cNvPr id="261" name="Google Shape;261;p33"/>
+          <p:cNvPr id="265" name="Google Shape;265;p33"/>
           <p:cNvSpPr txBox="1"/>
           <p:nvPr>
             <p:ph idx="4" type="ctrTitle"/>
@@ -30378,7 +30199,7 @@
       </p:sp>
       <p:sp>
         <p:nvSpPr>
-          <p:cNvPr id="262" name="Google Shape;262;p33"/>
+          <p:cNvPr id="266" name="Google Shape;266;p33"/>
           <p:cNvSpPr txBox="1"/>
           <p:nvPr>
             <p:ph type="ctrTitle"/>
@@ -30423,7 +30244,7 @@
       </p:sp>
       <p:sp>
         <p:nvSpPr>
-          <p:cNvPr id="263" name="Google Shape;263;p33"/>
+          <p:cNvPr id="267" name="Google Shape;267;p33"/>
           <p:cNvSpPr txBox="1"/>
           <p:nvPr>
             <p:ph idx="2" type="ctrTitle"/>
@@ -30468,7 +30289,7 @@
       </p:sp>
       <p:sp>
         <p:nvSpPr>
-          <p:cNvPr id="264" name="Google Shape;264;p33"/>
+          <p:cNvPr id="268" name="Google Shape;268;p33"/>
           <p:cNvSpPr txBox="1"/>
           <p:nvPr>
             <p:ph idx="6" type="ctrTitle"/>
@@ -30513,7 +30334,7 @@
       </p:sp>
       <p:sp>
         <p:nvSpPr>
-          <p:cNvPr id="265" name="Google Shape;265;p33"/>
+          <p:cNvPr id="269" name="Google Shape;269;p33"/>
           <p:cNvSpPr txBox="1"/>
           <p:nvPr>
             <p:ph idx="9" type="title"/>
@@ -30558,7 +30379,7 @@
       </p:sp>
       <p:sp>
         <p:nvSpPr>
-          <p:cNvPr id="266" name="Google Shape;266;p33"/>
+          <p:cNvPr id="270" name="Google Shape;270;p33"/>
           <p:cNvSpPr txBox="1"/>
           <p:nvPr>
             <p:ph idx="13" type="title"/>
@@ -30598,7 +30419,7 @@
       </p:sp>
       <p:sp>
         <p:nvSpPr>
-          <p:cNvPr id="267" name="Google Shape;267;p33"/>
+          <p:cNvPr id="271" name="Google Shape;271;p33"/>
           <p:cNvSpPr txBox="1"/>
           <p:nvPr>
             <p:ph idx="14" type="title"/>
@@ -30638,7 +30459,7 @@
       </p:sp>
       <p:sp>
         <p:nvSpPr>
-          <p:cNvPr id="268" name="Google Shape;268;p33"/>
+          <p:cNvPr id="272" name="Google Shape;272;p33"/>
           <p:cNvSpPr txBox="1"/>
           <p:nvPr>
             <p:ph idx="15" type="title"/>
@@ -30678,7 +30499,7 @@
       </p:sp>
       <p:cxnSp>
         <p:nvCxnSpPr>
-          <p:cNvPr id="269" name="Google Shape;269;p33"/>
+          <p:cNvPr id="273" name="Google Shape;273;p33"/>
           <p:cNvCxnSpPr/>
           <p:nvPr/>
         </p:nvCxnSpPr>
@@ -30704,7 +30525,7 @@
       </p:cxnSp>
       <p:cxnSp>
         <p:nvCxnSpPr>
-          <p:cNvPr id="270" name="Google Shape;270;p33"/>
+          <p:cNvPr id="274" name="Google Shape;274;p33"/>
           <p:cNvCxnSpPr/>
           <p:nvPr/>
         </p:nvCxnSpPr>
@@ -30728,34 +30549,6 @@
           </a:ln>
         </p:spPr>
       </p:cxnSp>
-      <p:pic>
-        <p:nvPicPr>
-          <p:cNvPr id="271" name="Google Shape;271;p33"/>
-          <p:cNvPicPr preferRelativeResize="0"/>
-          <p:nvPr/>
-        </p:nvPicPr>
-        <p:blipFill>
-          <a:blip r:embed="rId3">
-            <a:alphaModFix/>
-          </a:blip>
-          <a:stretch>
-            <a:fillRect/>
-          </a:stretch>
-        </p:blipFill>
-        <p:spPr>
-          <a:xfrm>
-            <a:off x="7964475" y="154750"/>
-            <a:ext cx="1007550" cy="676470"/>
-          </a:xfrm>
-          <a:prstGeom prst="rect">
-            <a:avLst/>
-          </a:prstGeom>
-          <a:noFill/>
-          <a:ln>
-            <a:noFill/>
-          </a:ln>
-        </p:spPr>
-      </p:pic>
     </p:spTree>
   </p:cSld>
   <p:clrMapOvr>
@@ -30795,7 +30588,7 @@
                                           </p:stCondLst>
                                         </p:cTn>
                                         <p:tgtEl>
-                                          <p:spTgt spid="262"/>
+                                          <p:spTgt spid="266"/>
                                         </p:tgtEl>
                                         <p:attrNameLst>
                                           <p:attrName>style.visibility</p:attrName>
@@ -30809,7 +30602,77 @@
                                       <p:cBhvr>
                                         <p:cTn dur="1000"/>
                                         <p:tgtEl>
-                                          <p:spTgt spid="262"/>
+                                          <p:spTgt spid="266"/>
+                                        </p:tgtEl>
+                                      </p:cBhvr>
+                                    </p:animEffect>
+                                  </p:childTnLst>
+                                </p:cTn>
+                              </p:par>
+                              <p:par>
+                                <p:cTn fill="hold" nodeType="withEffect" presetClass="entr" presetID="10" presetSubtype="0">
+                                  <p:stCondLst>
+                                    <p:cond delay="0"/>
+                                  </p:stCondLst>
+                                  <p:childTnLst>
+                                    <p:set>
+                                      <p:cBhvr>
+                                        <p:cTn dur="1" fill="hold">
+                                          <p:stCondLst>
+                                            <p:cond delay="0"/>
+                                          </p:stCondLst>
+                                        </p:cTn>
+                                        <p:tgtEl>
+                                          <p:spTgt spid="269"/>
+                                        </p:tgtEl>
+                                        <p:attrNameLst>
+                                          <p:attrName>style.visibility</p:attrName>
+                                        </p:attrNameLst>
+                                      </p:cBhvr>
+                                      <p:to>
+                                        <p:strVal val="visible"/>
+                                      </p:to>
+                                    </p:set>
+                                    <p:animEffect filter="fade" transition="in">
+                                      <p:cBhvr>
+                                        <p:cTn dur="1000"/>
+                                        <p:tgtEl>
+                                          <p:spTgt spid="269"/>
+                                        </p:tgtEl>
+                                      </p:cBhvr>
+                                    </p:animEffect>
+                                  </p:childTnLst>
+                                </p:cTn>
+                              </p:par>
+                              <p:par>
+                                <p:cTn fill="hold" nodeType="withEffect" presetClass="entr" presetID="10" presetSubtype="0">
+                                  <p:stCondLst>
+                                    <p:cond delay="0"/>
+                                  </p:stCondLst>
+                                  <p:childTnLst>
+                                    <p:set>
+                                      <p:cBhvr>
+                                        <p:cTn dur="1" fill="hold">
+                                          <p:stCondLst>
+                                            <p:cond delay="0"/>
+                                          </p:stCondLst>
+                                        </p:cTn>
+                                        <p:tgtEl>
+                                          <p:spTgt spid="271"/>
+                                        </p:tgtEl>
+                                        <p:attrNameLst>
+                                          <p:attrName>style.visibility</p:attrName>
+                                        </p:attrNameLst>
+                                      </p:cBhvr>
+                                      <p:to>
+                                        <p:strVal val="visible"/>
+                                      </p:to>
+                                    </p:set>
+                                    <p:animEffect filter="fade" transition="in">
+                                      <p:cBhvr>
+                                        <p:cTn dur="1000"/>
+                                        <p:tgtEl>
+                                          <p:spTgt spid="271"/>
                                         </p:tgtEl>
                                       </p:cBhvr>
                                     </p:animEffect>
@@ -30900,7 +30763,7 @@
                                           </p:stCondLst>
                                         </p:cTn>
                                         <p:tgtEl>
-                                          <p:spTgt spid="261"/>
+                                          <p:spTgt spid="270"/>
                                         </p:tgtEl>
                                         <p:attrNameLst>
                                           <p:attrName>style.visibility</p:attrName>
@@ -30914,7 +30777,7 @@
                                       <p:cBhvr>
                                         <p:cTn dur="1000"/>
                                         <p:tgtEl>
-                                          <p:spTgt spid="261"/>
+                                          <p:spTgt spid="270"/>
                                         </p:tgtEl>
                                       </p:cBhvr>
                                     </p:animEffect>
@@ -30935,7 +30798,7 @@
                                           </p:stCondLst>
                                         </p:cTn>
                                         <p:tgtEl>
-                                          <p:spTgt spid="263"/>
+                                          <p:spTgt spid="272"/>
                                         </p:tgtEl>
                                         <p:attrNameLst>
                                           <p:attrName>style.visibility</p:attrName>
@@ -30949,42 +30812,7 @@
                                       <p:cBhvr>
                                         <p:cTn dur="1000"/>
                                         <p:tgtEl>
-                                          <p:spTgt spid="263"/>
-                                        </p:tgtEl>
-                                      </p:cBhvr>
-                                    </p:animEffect>
-                                  </p:childTnLst>
-                                </p:cTn>
-                              </p:par>
-                              <p:par>
-                                <p:cTn fill="hold" nodeType="withEffect" presetClass="entr" presetID="10" presetSubtype="0">
-                                  <p:stCondLst>
-                                    <p:cond delay="0"/>
-                                  </p:stCondLst>
-                                  <p:childTnLst>
-                                    <p:set>
-                                      <p:cBhvr>
-                                        <p:cTn dur="1" fill="hold">
-                                          <p:stCondLst>
-                                            <p:cond delay="0"/>
-                                          </p:stCondLst>
-                                        </p:cTn>
-                                        <p:tgtEl>
-                                          <p:spTgt spid="266"/>
-                                        </p:tgtEl>
-                                        <p:attrNameLst>
-                                          <p:attrName>style.visibility</p:attrName>
-                                        </p:attrNameLst>
-                                      </p:cBhvr>
-                                      <p:to>
-                                        <p:strVal val="visible"/>
-                                      </p:to>
-                                    </p:set>
-                                    <p:animEffect filter="fade" transition="in">
-                                      <p:cBhvr>
-                                        <p:cTn dur="1000"/>
-                                        <p:tgtEl>
-                                          <p:spTgt spid="266"/>
+                                          <p:spTgt spid="272"/>
                                         </p:tgtEl>
                                       </p:cBhvr>
                                     </p:animEffect>
@@ -31020,41 +30848,6 @@
                                         <p:cTn dur="1000"/>
                                         <p:tgtEl>
                                           <p:spTgt spid="268"/>
-                                        </p:tgtEl>
-                                      </p:cBhvr>
-                                    </p:animEffect>
-                                  </p:childTnLst>
-                                </p:cTn>
-                              </p:par>
-                              <p:par>
-                                <p:cTn fill="hold" nodeType="withEffect" presetClass="entr" presetID="10" presetSubtype="0">
-                                  <p:stCondLst>
-                                    <p:cond delay="0"/>
-                                  </p:stCondLst>
-                                  <p:childTnLst>
-                                    <p:set>
-                                      <p:cBhvr>
-                                        <p:cTn dur="1" fill="hold">
-                                          <p:stCondLst>
-                                            <p:cond delay="0"/>
-                                          </p:stCondLst>
-                                        </p:cTn>
-                                        <p:tgtEl>
-                                          <p:spTgt spid="264"/>
-                                        </p:tgtEl>
-                                        <p:attrNameLst>
-                                          <p:attrName>style.visibility</p:attrName>
-                                        </p:attrNameLst>
-                                      </p:cBhvr>
-                                      <p:to>
-                                        <p:strVal val="visible"/>
-                                      </p:to>
-                                    </p:set>
-                                    <p:animEffect filter="fade" transition="in">
-                                      <p:cBhvr>
-                                        <p:cTn dur="1000"/>
-                                        <p:tgtEl>
-                                          <p:spTgt spid="264"/>
                                         </p:tgtEl>
                                       </p:cBhvr>
                                     </p:animEffect>
@@ -31097,7 +30890,7 @@
   <p:cSld>
     <p:spTree>
       <p:nvGrpSpPr>
-        <p:cNvPr id="275" name="Shape 275"/>
+        <p:cNvPr id="278" name="Shape 278"/>
         <p:cNvGrpSpPr/>
         <p:nvPr/>
       </p:nvGrpSpPr>
@@ -31111,7 +30904,7 @@
       </p:grpSpPr>
       <p:sp>
         <p:nvSpPr>
-          <p:cNvPr id="276" name="Google Shape;276;p34"/>
+          <p:cNvPr id="279" name="Google Shape;279;p34"/>
           <p:cNvSpPr txBox="1"/>
           <p:nvPr>
             <p:ph type="ctrTitle"/>
@@ -31155,7 +30948,7 @@
       </p:sp>
       <p:sp>
         <p:nvSpPr>
-          <p:cNvPr id="277" name="Google Shape;277;p34"/>
+          <p:cNvPr id="280" name="Google Shape;280;p34"/>
           <p:cNvSpPr txBox="1"/>
           <p:nvPr>
             <p:ph idx="1" type="subTitle"/>
@@ -31211,34 +31004,6 @@
           </a:p>
         </p:txBody>
       </p:sp>
-      <p:pic>
-        <p:nvPicPr>
-          <p:cNvPr id="278" name="Google Shape;278;p34"/>
-          <p:cNvPicPr preferRelativeResize="0"/>
-          <p:nvPr/>
-        </p:nvPicPr>
-        <p:blipFill>
-          <a:blip r:embed="rId3">
-            <a:alphaModFix/>
-          </a:blip>
-          <a:stretch>
-            <a:fillRect/>
-          </a:stretch>
-        </p:blipFill>
-        <p:spPr>
-          <a:xfrm>
-            <a:off x="7964475" y="154750"/>
-            <a:ext cx="1007550" cy="676470"/>
-          </a:xfrm>
-          <a:prstGeom prst="rect">
-            <a:avLst/>
-          </a:prstGeom>
-          <a:noFill/>
-          <a:ln>
-            <a:noFill/>
-          </a:ln>
-        </p:spPr>
-      </p:pic>
     </p:spTree>
   </p:cSld>
   <p:clrMapOvr>
@@ -31274,7 +31039,7 @@
                                       <p:cBhvr additive="base">
                                         <p:cTn dur="1000"/>
                                         <p:tgtEl>
-                                          <p:spTgt spid="276"/>
+                                          <p:spTgt spid="279"/>
                                         </p:tgtEl>
                                         <p:attrNameLst>
                                           <p:attrName>ppt_x</p:attrName>
@@ -31301,7 +31066,7 @@
                                           </p:stCondLst>
                                         </p:cTn>
                                         <p:tgtEl>
-                                          <p:spTgt spid="276"/>
+                                          <p:spTgt spid="279"/>
                                         </p:tgtEl>
                                         <p:attrNameLst>
                                           <p:attrName>style.visibility</p:attrName>
@@ -31346,7 +31111,7 @@
                                           </p:stCondLst>
                                         </p:cTn>
                                         <p:tgtEl>
-                                          <p:spTgt spid="277"/>
+                                          <p:spTgt spid="280"/>
                                         </p:tgtEl>
                                         <p:attrNameLst>
                                           <p:attrName>style.visibility</p:attrName>
@@ -31360,7 +31125,7 @@
                                       <p:cBhvr>
                                         <p:cTn dur="1000"/>
                                         <p:tgtEl>
-                                          <p:spTgt spid="277"/>
+                                          <p:spTgt spid="280"/>
                                         </p:tgtEl>
                                       </p:cBhvr>
                                     </p:animEffect>
@@ -31403,7 +31168,7 @@
   <p:cSld>
     <p:spTree>
       <p:nvGrpSpPr>
-        <p:cNvPr id="282" name="Shape 282"/>
+        <p:cNvPr id="284" name="Shape 284"/>
         <p:cNvGrpSpPr/>
         <p:nvPr/>
       </p:nvGrpSpPr>
@@ -31415,37 +31180,9 @@
           <a:chExt cx="0" cy="0"/>
         </a:xfrm>
       </p:grpSpPr>
-      <p:pic>
-        <p:nvPicPr>
-          <p:cNvPr id="283" name="Google Shape;283;p35"/>
-          <p:cNvPicPr preferRelativeResize="0"/>
-          <p:nvPr/>
-        </p:nvPicPr>
-        <p:blipFill>
-          <a:blip r:embed="rId3">
-            <a:alphaModFix/>
-          </a:blip>
-          <a:stretch>
-            <a:fillRect/>
-          </a:stretch>
-        </p:blipFill>
-        <p:spPr>
-          <a:xfrm>
-            <a:off x="7964475" y="154750"/>
-            <a:ext cx="1007550" cy="676470"/>
-          </a:xfrm>
-          <a:prstGeom prst="rect">
-            <a:avLst/>
-          </a:prstGeom>
-          <a:noFill/>
-          <a:ln>
-            <a:noFill/>
-          </a:ln>
-        </p:spPr>
-      </p:pic>
       <p:sp>
         <p:nvSpPr>
-          <p:cNvPr id="284" name="Google Shape;284;p35"/>
+          <p:cNvPr id="285" name="Google Shape;285;p35"/>
           <p:cNvSpPr txBox="1"/>
           <p:nvPr>
             <p:ph type="ctrTitle"/>
@@ -31485,7 +31222,7 @@
       </p:sp>
       <p:sp>
         <p:nvSpPr>
-          <p:cNvPr id="285" name="Google Shape;285;p35"/>
+          <p:cNvPr id="286" name="Google Shape;286;p35"/>
           <p:cNvSpPr txBox="1"/>
           <p:nvPr>
             <p:ph idx="1" type="subTitle"/>
@@ -31608,7 +31345,7 @@
   <p:cSld>
     <p:spTree>
       <p:nvGrpSpPr>
-        <p:cNvPr id="289" name="Shape 289"/>
+        <p:cNvPr id="290" name="Shape 290"/>
         <p:cNvGrpSpPr/>
         <p:nvPr/>
       </p:nvGrpSpPr>
@@ -31620,34 +31357,6 @@
           <a:chExt cx="0" cy="0"/>
         </a:xfrm>
       </p:grpSpPr>
-      <p:pic>
-        <p:nvPicPr>
-          <p:cNvPr id="290" name="Google Shape;290;p36"/>
-          <p:cNvPicPr preferRelativeResize="0"/>
-          <p:nvPr/>
-        </p:nvPicPr>
-        <p:blipFill>
-          <a:blip r:embed="rId3">
-            <a:alphaModFix/>
-          </a:blip>
-          <a:stretch>
-            <a:fillRect/>
-          </a:stretch>
-        </p:blipFill>
-        <p:spPr>
-          <a:xfrm>
-            <a:off x="7964475" y="154750"/>
-            <a:ext cx="1007550" cy="676470"/>
-          </a:xfrm>
-          <a:prstGeom prst="rect">
-            <a:avLst/>
-          </a:prstGeom>
-          <a:noFill/>
-          <a:ln>
-            <a:noFill/>
-          </a:ln>
-        </p:spPr>
-      </p:pic>
       <p:sp>
         <p:nvSpPr>
           <p:cNvPr id="291" name="Google Shape;291;p36"/>
@@ -31794,37 +31503,9 @@
           </a:ln>
         </p:spPr>
       </p:pic>
-      <p:pic>
-        <p:nvPicPr>
-          <p:cNvPr id="298" name="Google Shape;298;p37"/>
-          <p:cNvPicPr preferRelativeResize="0"/>
-          <p:nvPr/>
-        </p:nvPicPr>
-        <p:blipFill>
-          <a:blip r:embed="rId4">
-            <a:alphaModFix/>
-          </a:blip>
-          <a:stretch>
-            <a:fillRect/>
-          </a:stretch>
-        </p:blipFill>
-        <p:spPr>
-          <a:xfrm>
-            <a:off x="7964475" y="154750"/>
-            <a:ext cx="1007550" cy="676470"/>
-          </a:xfrm>
-          <a:prstGeom prst="rect">
-            <a:avLst/>
-          </a:prstGeom>
-          <a:noFill/>
-          <a:ln>
-            <a:noFill/>
-          </a:ln>
-        </p:spPr>
-      </p:pic>
       <p:sp>
         <p:nvSpPr>
-          <p:cNvPr id="299" name="Google Shape;299;p37"/>
+          <p:cNvPr id="298" name="Google Shape;298;p37"/>
           <p:cNvSpPr txBox="1"/>
           <p:nvPr>
             <p:ph type="ctrTitle"/>
@@ -31875,7 +31556,7 @@
   <p:cSld>
     <p:spTree>
       <p:nvGrpSpPr>
-        <p:cNvPr id="303" name="Shape 303"/>
+        <p:cNvPr id="302" name="Shape 302"/>
         <p:cNvGrpSpPr/>
         <p:nvPr/>
       </p:nvGrpSpPr>
@@ -31889,7 +31570,7 @@
       </p:grpSpPr>
       <p:sp>
         <p:nvSpPr>
-          <p:cNvPr id="304" name="Google Shape;304;p38"/>
+          <p:cNvPr id="303" name="Google Shape;303;p38"/>
           <p:cNvSpPr txBox="1"/>
           <p:nvPr>
             <p:ph type="ctrTitle"/>
@@ -31934,7 +31615,7 @@
       </p:sp>
       <p:sp>
         <p:nvSpPr>
-          <p:cNvPr id="305" name="Google Shape;305;p38"/>
+          <p:cNvPr id="304" name="Google Shape;304;p38"/>
           <p:cNvSpPr txBox="1"/>
           <p:nvPr>
             <p:ph idx="1" type="subTitle"/>
@@ -32008,34 +31689,6 @@
           </a:p>
         </p:txBody>
       </p:sp>
-      <p:pic>
-        <p:nvPicPr>
-          <p:cNvPr id="306" name="Google Shape;306;p38"/>
-          <p:cNvPicPr preferRelativeResize="0"/>
-          <p:nvPr/>
-        </p:nvPicPr>
-        <p:blipFill>
-          <a:blip r:embed="rId3">
-            <a:alphaModFix/>
-          </a:blip>
-          <a:stretch>
-            <a:fillRect/>
-          </a:stretch>
-        </p:blipFill>
-        <p:spPr>
-          <a:xfrm>
-            <a:off x="7964475" y="154750"/>
-            <a:ext cx="1007550" cy="676470"/>
-          </a:xfrm>
-          <a:prstGeom prst="rect">
-            <a:avLst/>
-          </a:prstGeom>
-          <a:noFill/>
-          <a:ln>
-            <a:noFill/>
-          </a:ln>
-        </p:spPr>
-      </p:pic>
     </p:spTree>
   </p:cSld>
   <p:clrMapOvr>
@@ -32071,7 +31724,7 @@
                                       <p:cBhvr additive="base">
                                         <p:cTn dur="1000"/>
                                         <p:tgtEl>
-                                          <p:spTgt spid="304"/>
+                                          <p:spTgt spid="303"/>
                                         </p:tgtEl>
                                         <p:attrNameLst>
                                           <p:attrName>ppt_x</p:attrName>
@@ -32098,7 +31751,7 @@
                                           </p:stCondLst>
                                         </p:cTn>
                                         <p:tgtEl>
-                                          <p:spTgt spid="304"/>
+                                          <p:spTgt spid="303"/>
                                         </p:tgtEl>
                                         <p:attrNameLst>
                                           <p:attrName>style.visibility</p:attrName>
@@ -32143,7 +31796,7 @@
                                           </p:stCondLst>
                                         </p:cTn>
                                         <p:tgtEl>
-                                          <p:spTgt spid="305"/>
+                                          <p:spTgt spid="304"/>
                                         </p:tgtEl>
                                         <p:attrNameLst>
                                           <p:attrName>style.visibility</p:attrName>
@@ -32157,7 +31810,7 @@
                                       <p:cBhvr>
                                         <p:cTn dur="1000"/>
                                         <p:tgtEl>
-                                          <p:spTgt spid="305"/>
+                                          <p:spTgt spid="304"/>
                                         </p:tgtEl>
                                       </p:cBhvr>
                                     </p:animEffect>
@@ -32200,7 +31853,7 @@
   <p:cSld>
     <p:spTree>
       <p:nvGrpSpPr>
-        <p:cNvPr id="310" name="Shape 310"/>
+        <p:cNvPr id="308" name="Shape 308"/>
         <p:cNvGrpSpPr/>
         <p:nvPr/>
       </p:nvGrpSpPr>
@@ -32214,40 +31867,12 @@
       </p:grpSpPr>
       <p:pic>
         <p:nvPicPr>
-          <p:cNvPr id="311" name="Google Shape;311;p39"/>
+          <p:cNvPr id="309" name="Google Shape;309;p39"/>
           <p:cNvPicPr preferRelativeResize="0"/>
           <p:nvPr/>
         </p:nvPicPr>
         <p:blipFill>
           <a:blip r:embed="rId3">
-            <a:alphaModFix/>
-          </a:blip>
-          <a:stretch>
-            <a:fillRect/>
-          </a:stretch>
-        </p:blipFill>
-        <p:spPr>
-          <a:xfrm>
-            <a:off x="7964475" y="154750"/>
-            <a:ext cx="1007550" cy="676470"/>
-          </a:xfrm>
-          <a:prstGeom prst="rect">
-            <a:avLst/>
-          </a:prstGeom>
-          <a:noFill/>
-          <a:ln>
-            <a:noFill/>
-          </a:ln>
-        </p:spPr>
-      </p:pic>
-      <p:pic>
-        <p:nvPicPr>
-          <p:cNvPr id="312" name="Google Shape;312;p39"/>
-          <p:cNvPicPr preferRelativeResize="0"/>
-          <p:nvPr/>
-        </p:nvPicPr>
-        <p:blipFill>
-          <a:blip r:embed="rId4">
             <a:alphaModFix/>
           </a:blip>
           <a:stretch>

</xml_diff>